<commit_message>
Added remark to history
</commit_message>
<xml_diff>
--- a/CPlusPlus/00_essential_cpp_intro.pptx
+++ b/CPlusPlus/00_essential_cpp_intro.pptx
@@ -111,6 +111,11 @@
       </a:defRPr>
     </a:lvl9pPr>
   </p:defaultTextStyle>
+  <p:extLst>
+    <p:ext uri="{EFAFB233-063F-42B5-8137-9DF3F51BA10A}">
+      <p15:sldGuideLst xmlns:p15="http://schemas.microsoft.com/office/powerpoint/2012/main"/>
+    </p:ext>
+  </p:extLst>
 </p:presentation>
 </file>
 
@@ -196,7 +201,7 @@
           <a:p>
             <a:fld id="{1C0640CC-666A-4604-A9BC-2EDD7357F8B7}" type="datetimeFigureOut">
               <a:rPr lang="en-US" smtClean="0"/>
-              <a:t>2017-02-14</a:t>
+              <a:t>2017-02-17</a:t>
             </a:fld>
             <a:endParaRPr lang="en-US"/>
           </a:p>
@@ -679,7 +684,7 @@
           <a:p>
             <a:fld id="{37F512DE-47A6-4584-ADE2-15D26CE3A2AF}" type="datetimeFigureOut">
               <a:rPr lang="en-US" smtClean="0"/>
-              <a:t>2017-02-14</a:t>
+              <a:t>2017-02-17</a:t>
             </a:fld>
             <a:endParaRPr lang="en-US"/>
           </a:p>
@@ -849,7 +854,7 @@
           <a:p>
             <a:fld id="{37F512DE-47A6-4584-ADE2-15D26CE3A2AF}" type="datetimeFigureOut">
               <a:rPr lang="en-US" smtClean="0"/>
-              <a:t>2017-02-14</a:t>
+              <a:t>2017-02-17</a:t>
             </a:fld>
             <a:endParaRPr lang="en-US"/>
           </a:p>
@@ -1029,7 +1034,7 @@
           <a:p>
             <a:fld id="{37F512DE-47A6-4584-ADE2-15D26CE3A2AF}" type="datetimeFigureOut">
               <a:rPr lang="en-US" smtClean="0"/>
-              <a:t>2017-02-14</a:t>
+              <a:t>2017-02-17</a:t>
             </a:fld>
             <a:endParaRPr lang="en-US"/>
           </a:p>
@@ -1199,7 +1204,7 @@
           <a:p>
             <a:fld id="{37F512DE-47A6-4584-ADE2-15D26CE3A2AF}" type="datetimeFigureOut">
               <a:rPr lang="en-US" smtClean="0"/>
-              <a:t>2017-02-14</a:t>
+              <a:t>2017-02-17</a:t>
             </a:fld>
             <a:endParaRPr lang="en-US"/>
           </a:p>
@@ -1443,7 +1448,7 @@
           <a:p>
             <a:fld id="{37F512DE-47A6-4584-ADE2-15D26CE3A2AF}" type="datetimeFigureOut">
               <a:rPr lang="en-US" smtClean="0"/>
-              <a:t>2017-02-14</a:t>
+              <a:t>2017-02-17</a:t>
             </a:fld>
             <a:endParaRPr lang="en-US"/>
           </a:p>
@@ -1675,7 +1680,7 @@
           <a:p>
             <a:fld id="{37F512DE-47A6-4584-ADE2-15D26CE3A2AF}" type="datetimeFigureOut">
               <a:rPr lang="en-US" smtClean="0"/>
-              <a:t>2017-02-14</a:t>
+              <a:t>2017-02-17</a:t>
             </a:fld>
             <a:endParaRPr lang="en-US"/>
           </a:p>
@@ -2042,7 +2047,7 @@
           <a:p>
             <a:fld id="{37F512DE-47A6-4584-ADE2-15D26CE3A2AF}" type="datetimeFigureOut">
               <a:rPr lang="en-US" smtClean="0"/>
-              <a:t>2017-02-14</a:t>
+              <a:t>2017-02-17</a:t>
             </a:fld>
             <a:endParaRPr lang="en-US"/>
           </a:p>
@@ -2160,7 +2165,7 @@
           <a:p>
             <a:fld id="{37F512DE-47A6-4584-ADE2-15D26CE3A2AF}" type="datetimeFigureOut">
               <a:rPr lang="en-US" smtClean="0"/>
-              <a:t>2017-02-14</a:t>
+              <a:t>2017-02-17</a:t>
             </a:fld>
             <a:endParaRPr lang="en-US"/>
           </a:p>
@@ -2255,7 +2260,7 @@
           <a:p>
             <a:fld id="{37F512DE-47A6-4584-ADE2-15D26CE3A2AF}" type="datetimeFigureOut">
               <a:rPr lang="en-US" smtClean="0"/>
-              <a:t>2017-02-14</a:t>
+              <a:t>2017-02-17</a:t>
             </a:fld>
             <a:endParaRPr lang="en-US"/>
           </a:p>
@@ -2532,7 +2537,7 @@
           <a:p>
             <a:fld id="{37F512DE-47A6-4584-ADE2-15D26CE3A2AF}" type="datetimeFigureOut">
               <a:rPr lang="en-US" smtClean="0"/>
-              <a:t>2017-02-14</a:t>
+              <a:t>2017-02-17</a:t>
             </a:fld>
             <a:endParaRPr lang="en-US"/>
           </a:p>
@@ -2789,7 +2794,7 @@
           <a:p>
             <a:fld id="{37F512DE-47A6-4584-ADE2-15D26CE3A2AF}" type="datetimeFigureOut">
               <a:rPr lang="en-US" smtClean="0"/>
-              <a:t>2017-02-14</a:t>
+              <a:t>2017-02-17</a:t>
             </a:fld>
             <a:endParaRPr lang="en-US"/>
           </a:p>
@@ -3002,7 +3007,7 @@
           <a:p>
             <a:fld id="{37F512DE-47A6-4584-ADE2-15D26CE3A2AF}" type="datetimeFigureOut">
               <a:rPr lang="en-US" smtClean="0"/>
-              <a:t>2017-02-14</a:t>
+              <a:t>2017-02-17</a:t>
             </a:fld>
             <a:endParaRPr lang="en-US"/>
           </a:p>
@@ -3424,11 +3429,7 @@
           <a:p>
             <a:r>
               <a:rPr lang="en-US" dirty="0" smtClean="0"/>
-              <a:t>Essential C</a:t>
-            </a:r>
-            <a:r>
-              <a:rPr lang="en-US" dirty="0" smtClean="0"/>
-              <a:t>++</a:t>
+              <a:t>Essential C++</a:t>
             </a:r>
             <a:r>
               <a:rPr lang="en-US" dirty="0"/>
@@ -4264,8 +4265,13 @@
             <a:pPr lvl="1"/>
             <a:r>
               <a:rPr lang="en-US" dirty="0" smtClean="0"/>
-              <a:t>C++98 (coming of age)</a:t>
-            </a:r>
+              <a:t>C++98 (coming of </a:t>
+            </a:r>
+            <a:r>
+              <a:rPr lang="en-US" dirty="0" smtClean="0"/>
+              <a:t>age: ISO standardization)</a:t>
+            </a:r>
+            <a:endParaRPr lang="en-US" dirty="0" smtClean="0"/>
           </a:p>
           <a:p>
             <a:pPr lvl="1"/>

</xml_diff>